<commit_message>
aggiunto sintesi traccia degli argomenti delle due giornate
</commit_message>
<xml_diff>
--- a/EY Technology Overview.pptx
+++ b/EY Technology Overview.pptx
@@ -5,10 +5,7 @@
     <p:sldMasterId id="2147483648" r:id="rId1"/>
   </p:sldMasterIdLst>
   <p:sldIdLst>
-    <p:sldId id="256" r:id="rId2"/>
-    <p:sldId id="257" r:id="rId3"/>
-    <p:sldId id="258" r:id="rId4"/>
-    <p:sldId id="259" r:id="rId5"/>
+    <p:sldId id="257" r:id="rId2"/>
   </p:sldIdLst>
   <p:sldSz cx="12192000" cy="6858000"/>
   <p:notesSz cx="6858000" cy="9144000"/>
@@ -3334,94 +3331,6 @@
           <p:cNvPr id="2" name="Titolo 1">
             <a:extLst>
               <a:ext uri="{FF2B5EF4-FFF2-40B4-BE49-F238E27FC236}">
-                <a16:creationId xmlns:a16="http://schemas.microsoft.com/office/drawing/2014/main" id="{FA0C122B-4136-4002-8DD2-8271C0860CF9}"/>
-              </a:ext>
-            </a:extLst>
-          </p:cNvPr>
-          <p:cNvSpPr>
-            <a:spLocks noGrp="1"/>
-          </p:cNvSpPr>
-          <p:nvPr>
-            <p:ph type="ctrTitle"/>
-          </p:nvPr>
-        </p:nvSpPr>
-        <p:spPr/>
-        <p:txBody>
-          <a:bodyPr/>
-          <a:lstStyle/>
-          <a:p>
-            <a:r>
-              <a:rPr lang="it-IT" dirty="0"/>
-              <a:t>EY Technology </a:t>
-            </a:r>
-            <a:r>
-              <a:rPr lang="it-IT" dirty="0" err="1"/>
-              <a:t>Overview</a:t>
-            </a:r>
-            <a:endParaRPr lang="it-IT" dirty="0"/>
-          </a:p>
-        </p:txBody>
-      </p:sp>
-      <p:sp>
-        <p:nvSpPr>
-          <p:cNvPr id="3" name="Sottotitolo 2">
-            <a:extLst>
-              <a:ext uri="{FF2B5EF4-FFF2-40B4-BE49-F238E27FC236}">
-                <a16:creationId xmlns:a16="http://schemas.microsoft.com/office/drawing/2014/main" id="{DB591643-4EEC-4AE4-A84A-AD42E9BDB003}"/>
-              </a:ext>
-            </a:extLst>
-          </p:cNvPr>
-          <p:cNvSpPr>
-            <a:spLocks noGrp="1"/>
-          </p:cNvSpPr>
-          <p:nvPr>
-            <p:ph type="subTitle" idx="1"/>
-          </p:nvPr>
-        </p:nvSpPr>
-        <p:spPr/>
-        <p:txBody>
-          <a:bodyPr/>
-          <a:lstStyle/>
-          <a:p>
-            <a:endParaRPr lang="it-IT"/>
-          </a:p>
-        </p:txBody>
-      </p:sp>
-    </p:spTree>
-    <p:extLst>
-      <p:ext uri="{BB962C8B-B14F-4D97-AF65-F5344CB8AC3E}">
-        <p14:creationId xmlns:p14="http://schemas.microsoft.com/office/powerpoint/2010/main" val="597076486"/>
-      </p:ext>
-    </p:extLst>
-  </p:cSld>
-  <p:clrMapOvr>
-    <a:masterClrMapping/>
-  </p:clrMapOvr>
-</p:sld>
-</file>
-
-<file path=ppt/slides/slide2.xml><?xml version="1.0" encoding="utf-8"?>
-<p:sld xmlns:a="http://schemas.openxmlformats.org/drawingml/2006/main" xmlns:r="http://schemas.openxmlformats.org/officeDocument/2006/relationships" xmlns:p="http://schemas.openxmlformats.org/presentationml/2006/main">
-  <p:cSld>
-    <p:spTree>
-      <p:nvGrpSpPr>
-        <p:cNvPr id="1" name=""/>
-        <p:cNvGrpSpPr/>
-        <p:nvPr/>
-      </p:nvGrpSpPr>
-      <p:grpSpPr>
-        <a:xfrm>
-          <a:off x="0" y="0"/>
-          <a:ext cx="0" cy="0"/>
-          <a:chOff x="0" y="0"/>
-          <a:chExt cx="0" cy="0"/>
-        </a:xfrm>
-      </p:grpSpPr>
-      <p:sp>
-        <p:nvSpPr>
-          <p:cNvPr id="2" name="Titolo 1">
-            <a:extLst>
-              <a:ext uri="{FF2B5EF4-FFF2-40B4-BE49-F238E27FC236}">
                 <a16:creationId xmlns:a16="http://schemas.microsoft.com/office/drawing/2014/main" id="{D58384CF-FCAB-42CF-A99F-90C4AEDD288A}"/>
               </a:ext>
             </a:extLst>
@@ -3578,370 +3487,6 @@
     <p:extLst>
       <p:ext uri="{BB962C8B-B14F-4D97-AF65-F5344CB8AC3E}">
         <p14:creationId xmlns:p14="http://schemas.microsoft.com/office/powerpoint/2010/main" val="2853249685"/>
-      </p:ext>
-    </p:extLst>
-  </p:cSld>
-  <p:clrMapOvr>
-    <a:masterClrMapping/>
-  </p:clrMapOvr>
-</p:sld>
-</file>
-
-<file path=ppt/slides/slide3.xml><?xml version="1.0" encoding="utf-8"?>
-<p:sld xmlns:a="http://schemas.openxmlformats.org/drawingml/2006/main" xmlns:r="http://schemas.openxmlformats.org/officeDocument/2006/relationships" xmlns:p="http://schemas.openxmlformats.org/presentationml/2006/main">
-  <p:cSld>
-    <p:spTree>
-      <p:nvGrpSpPr>
-        <p:cNvPr id="1" name=""/>
-        <p:cNvGrpSpPr/>
-        <p:nvPr/>
-      </p:nvGrpSpPr>
-      <p:grpSpPr>
-        <a:xfrm>
-          <a:off x="0" y="0"/>
-          <a:ext cx="0" cy="0"/>
-          <a:chOff x="0" y="0"/>
-          <a:chExt cx="0" cy="0"/>
-        </a:xfrm>
-      </p:grpSpPr>
-      <p:sp>
-        <p:nvSpPr>
-          <p:cNvPr id="2" name="Titolo 1">
-            <a:extLst>
-              <a:ext uri="{FF2B5EF4-FFF2-40B4-BE49-F238E27FC236}">
-                <a16:creationId xmlns:a16="http://schemas.microsoft.com/office/drawing/2014/main" id="{841C7D3C-FFE9-4198-B350-8EBFB1093B29}"/>
-              </a:ext>
-            </a:extLst>
-          </p:cNvPr>
-          <p:cNvSpPr>
-            <a:spLocks noGrp="1"/>
-          </p:cNvSpPr>
-          <p:nvPr>
-            <p:ph type="title"/>
-          </p:nvPr>
-        </p:nvSpPr>
-        <p:spPr/>
-        <p:txBody>
-          <a:bodyPr/>
-          <a:lstStyle/>
-          <a:p>
-            <a:r>
-              <a:rPr lang="it-IT" dirty="0"/>
-              <a:t>Data Modeling</a:t>
-            </a:r>
-          </a:p>
-        </p:txBody>
-      </p:sp>
-      <p:sp>
-        <p:nvSpPr>
-          <p:cNvPr id="3" name="Segnaposto contenuto 2">
-            <a:extLst>
-              <a:ext uri="{FF2B5EF4-FFF2-40B4-BE49-F238E27FC236}">
-                <a16:creationId xmlns:a16="http://schemas.microsoft.com/office/drawing/2014/main" id="{E4117161-31C9-4F32-98C9-A18332C12427}"/>
-              </a:ext>
-            </a:extLst>
-          </p:cNvPr>
-          <p:cNvSpPr>
-            <a:spLocks noGrp="1"/>
-          </p:cNvSpPr>
-          <p:nvPr>
-            <p:ph idx="1"/>
-          </p:nvPr>
-        </p:nvSpPr>
-        <p:spPr/>
-        <p:txBody>
-          <a:bodyPr>
-            <a:normAutofit fontScale="92500" lnSpcReduction="10000"/>
-          </a:bodyPr>
-          <a:lstStyle/>
-          <a:p>
-            <a:r>
-              <a:rPr lang="it-IT" dirty="0"/>
-              <a:t>Schema concettuale</a:t>
-            </a:r>
-          </a:p>
-          <a:p>
-            <a:r>
-              <a:rPr lang="it-IT" dirty="0"/>
-              <a:t>Schema logico</a:t>
-            </a:r>
-          </a:p>
-          <a:p>
-            <a:r>
-              <a:rPr lang="it-IT" dirty="0"/>
-              <a:t>Schema fisico</a:t>
-            </a:r>
-          </a:p>
-          <a:p>
-            <a:r>
-              <a:rPr lang="it-IT" dirty="0"/>
-              <a:t>Da </a:t>
-            </a:r>
-            <a:r>
-              <a:rPr lang="it-IT" dirty="0" err="1"/>
-              <a:t>Entity</a:t>
-            </a:r>
-            <a:r>
-              <a:rPr lang="it-IT" dirty="0"/>
-              <a:t>/Relationship alle tabelle fisiche</a:t>
-            </a:r>
-          </a:p>
-          <a:p>
-            <a:pPr lvl="1"/>
-            <a:r>
-              <a:rPr lang="it-IT" dirty="0"/>
-              <a:t>Riduzione delle associazioni</a:t>
-            </a:r>
-          </a:p>
-          <a:p>
-            <a:r>
-              <a:rPr lang="it-IT" dirty="0"/>
-              <a:t>Sistemi transazionali</a:t>
-            </a:r>
-          </a:p>
-          <a:p>
-            <a:pPr lvl="1"/>
-            <a:r>
-              <a:rPr lang="it-IT" dirty="0"/>
-              <a:t>OLTP e ACID</a:t>
-            </a:r>
-          </a:p>
-          <a:p>
-            <a:r>
-              <a:rPr lang="it-IT" dirty="0"/>
-              <a:t>Data Warehouse</a:t>
-            </a:r>
-          </a:p>
-          <a:p>
-            <a:r>
-              <a:rPr lang="it-IT" dirty="0"/>
-              <a:t>ETL</a:t>
-            </a:r>
-          </a:p>
-          <a:p>
-            <a:r>
-              <a:rPr lang="it-IT" dirty="0"/>
-              <a:t>Data Analisys</a:t>
-            </a:r>
-          </a:p>
-        </p:txBody>
-      </p:sp>
-    </p:spTree>
-    <p:extLst>
-      <p:ext uri="{BB962C8B-B14F-4D97-AF65-F5344CB8AC3E}">
-        <p14:creationId xmlns:p14="http://schemas.microsoft.com/office/powerpoint/2010/main" val="1392713330"/>
-      </p:ext>
-    </p:extLst>
-  </p:cSld>
-  <p:clrMapOvr>
-    <a:masterClrMapping/>
-  </p:clrMapOvr>
-</p:sld>
-</file>
-
-<file path=ppt/slides/slide4.xml><?xml version="1.0" encoding="utf-8"?>
-<p:sld xmlns:a="http://schemas.openxmlformats.org/drawingml/2006/main" xmlns:r="http://schemas.openxmlformats.org/officeDocument/2006/relationships" xmlns:p="http://schemas.openxmlformats.org/presentationml/2006/main">
-  <p:cSld>
-    <p:spTree>
-      <p:nvGrpSpPr>
-        <p:cNvPr id="1" name=""/>
-        <p:cNvGrpSpPr/>
-        <p:nvPr/>
-      </p:nvGrpSpPr>
-      <p:grpSpPr>
-        <a:xfrm>
-          <a:off x="0" y="0"/>
-          <a:ext cx="0" cy="0"/>
-          <a:chOff x="0" y="0"/>
-          <a:chExt cx="0" cy="0"/>
-        </a:xfrm>
-      </p:grpSpPr>
-      <p:sp>
-        <p:nvSpPr>
-          <p:cNvPr id="2" name="Titolo 1">
-            <a:extLst>
-              <a:ext uri="{FF2B5EF4-FFF2-40B4-BE49-F238E27FC236}">
-                <a16:creationId xmlns:a16="http://schemas.microsoft.com/office/drawing/2014/main" id="{205F95C0-F089-4161-AA01-C28E9B8434EF}"/>
-              </a:ext>
-            </a:extLst>
-          </p:cNvPr>
-          <p:cNvSpPr>
-            <a:spLocks noGrp="1"/>
-          </p:cNvSpPr>
-          <p:nvPr>
-            <p:ph type="title"/>
-          </p:nvPr>
-        </p:nvSpPr>
-        <p:spPr/>
-        <p:txBody>
-          <a:bodyPr/>
-          <a:lstStyle/>
-          <a:p>
-            <a:r>
-              <a:rPr lang="it-IT" dirty="0" err="1"/>
-              <a:t>Archiettetture</a:t>
-            </a:r>
-            <a:r>
-              <a:rPr lang="it-IT" dirty="0"/>
-              <a:t> e componenti ERP</a:t>
-            </a:r>
-          </a:p>
-        </p:txBody>
-      </p:sp>
-      <p:sp>
-        <p:nvSpPr>
-          <p:cNvPr id="3" name="Segnaposto contenuto 2">
-            <a:extLst>
-              <a:ext uri="{FF2B5EF4-FFF2-40B4-BE49-F238E27FC236}">
-                <a16:creationId xmlns:a16="http://schemas.microsoft.com/office/drawing/2014/main" id="{36319C70-31E0-4045-A294-83EB7A59BBE4}"/>
-              </a:ext>
-            </a:extLst>
-          </p:cNvPr>
-          <p:cNvSpPr>
-            <a:spLocks noGrp="1"/>
-          </p:cNvSpPr>
-          <p:nvPr>
-            <p:ph idx="1"/>
-          </p:nvPr>
-        </p:nvSpPr>
-        <p:spPr/>
-        <p:txBody>
-          <a:bodyPr>
-            <a:normAutofit fontScale="70000" lnSpcReduction="20000"/>
-          </a:bodyPr>
-          <a:lstStyle/>
-          <a:p>
-            <a:r>
-              <a:rPr lang="it-IT" dirty="0"/>
-              <a:t>Gestione integrata</a:t>
-            </a:r>
-          </a:p>
-          <a:p>
-            <a:r>
-              <a:rPr lang="it-IT" dirty="0"/>
-              <a:t>Componenti</a:t>
-            </a:r>
-          </a:p>
-          <a:p>
-            <a:pPr lvl="1"/>
-            <a:r>
-              <a:rPr lang="it-IT" dirty="0"/>
-              <a:t>Contabilità</a:t>
-            </a:r>
-          </a:p>
-          <a:p>
-            <a:pPr lvl="1"/>
-            <a:r>
-              <a:rPr lang="it-IT" dirty="0"/>
-              <a:t>Controllo di gestione</a:t>
-            </a:r>
-          </a:p>
-          <a:p>
-            <a:pPr lvl="1"/>
-            <a:r>
-              <a:rPr lang="it-IT" dirty="0"/>
-              <a:t>Gestione del personale</a:t>
-            </a:r>
-          </a:p>
-          <a:p>
-            <a:pPr lvl="1"/>
-            <a:r>
-              <a:rPr lang="it-IT" dirty="0"/>
-              <a:t>Gestione degli acquisti</a:t>
-            </a:r>
-          </a:p>
-          <a:p>
-            <a:pPr lvl="1"/>
-            <a:r>
-              <a:rPr lang="it-IT" dirty="0"/>
-              <a:t>Gestione dei magazzini</a:t>
-            </a:r>
-          </a:p>
-          <a:p>
-            <a:pPr lvl="1"/>
-            <a:r>
-              <a:rPr lang="it-IT" dirty="0" err="1"/>
-              <a:t>Material</a:t>
-            </a:r>
-            <a:r>
-              <a:rPr lang="it-IT" dirty="0"/>
-              <a:t> Requirements Planning - Pianificazione del fabbisogno dei materiali.</a:t>
-            </a:r>
-          </a:p>
-          <a:p>
-            <a:pPr lvl="1"/>
-            <a:r>
-              <a:rPr lang="it-IT" dirty="0"/>
-              <a:t>Gestione della produzione</a:t>
-            </a:r>
-          </a:p>
-          <a:p>
-            <a:pPr lvl="1"/>
-            <a:r>
-              <a:rPr lang="it-IT" dirty="0"/>
-              <a:t>Gestione progetti</a:t>
-            </a:r>
-          </a:p>
-          <a:p>
-            <a:pPr lvl="1"/>
-            <a:r>
-              <a:rPr lang="it-IT" dirty="0"/>
-              <a:t>Gestione delle vendite</a:t>
-            </a:r>
-          </a:p>
-          <a:p>
-            <a:pPr lvl="1"/>
-            <a:r>
-              <a:rPr lang="it-IT" dirty="0"/>
-              <a:t>Gestione della distribuzione</a:t>
-            </a:r>
-          </a:p>
-          <a:p>
-            <a:pPr lvl="1"/>
-            <a:r>
-              <a:rPr lang="it-IT" dirty="0"/>
-              <a:t>Gestione della manutenzione impianti</a:t>
-            </a:r>
-          </a:p>
-          <a:p>
-            <a:pPr lvl="1"/>
-            <a:r>
-              <a:rPr lang="it-IT" dirty="0"/>
-              <a:t>Gestione degli Asset</a:t>
-            </a:r>
-          </a:p>
-          <a:p>
-            <a:r>
-              <a:rPr lang="it-IT" dirty="0"/>
-              <a:t>Architetture</a:t>
-            </a:r>
-          </a:p>
-          <a:p>
-            <a:pPr lvl="1"/>
-            <a:r>
-              <a:rPr lang="it-IT" dirty="0"/>
-              <a:t>Da </a:t>
-            </a:r>
-            <a:r>
-              <a:rPr lang="it-IT" dirty="0" err="1"/>
-              <a:t>host</a:t>
-            </a:r>
-            <a:r>
-              <a:rPr lang="it-IT" dirty="0"/>
-              <a:t>/terminale a client/server a web </a:t>
-            </a:r>
-            <a:r>
-              <a:rPr lang="it-IT"/>
-              <a:t>a SOA e Saas</a:t>
-            </a:r>
-            <a:endParaRPr lang="it-IT" dirty="0"/>
-          </a:p>
-        </p:txBody>
-      </p:sp>
-    </p:spTree>
-    <p:extLst>
-      <p:ext uri="{BB962C8B-B14F-4D97-AF65-F5344CB8AC3E}">
-        <p14:creationId xmlns:p14="http://schemas.microsoft.com/office/powerpoint/2010/main" val="2794868849"/>
       </p:ext>
     </p:extLst>
   </p:cSld>

</xml_diff>